<commit_message>
other: prepare for release.
</commit_message>
<xml_diff>
--- a/.meow/icon.pptx
+++ b/.meow/icon.pptx
@@ -247,7 +247,7 @@
           <a:p>
             <a:fld id="{63C122E8-8589-4FE8-A359-9E666A3CF659}" type="datetimeFigureOut">
               <a:rPr lang="en-US" smtClean="0"/>
-              <a:t>2/9/2026</a:t>
+              <a:t>2/19/2026</a:t>
             </a:fld>
             <a:endParaRPr lang="en-US"/>
           </a:p>
@@ -417,7 +417,7 @@
           <a:p>
             <a:fld id="{63C122E8-8589-4FE8-A359-9E666A3CF659}" type="datetimeFigureOut">
               <a:rPr lang="en-US" smtClean="0"/>
-              <a:t>2/9/2026</a:t>
+              <a:t>2/19/2026</a:t>
             </a:fld>
             <a:endParaRPr lang="en-US"/>
           </a:p>
@@ -597,7 +597,7 @@
           <a:p>
             <a:fld id="{63C122E8-8589-4FE8-A359-9E666A3CF659}" type="datetimeFigureOut">
               <a:rPr lang="en-US" smtClean="0"/>
-              <a:t>2/9/2026</a:t>
+              <a:t>2/19/2026</a:t>
             </a:fld>
             <a:endParaRPr lang="en-US"/>
           </a:p>
@@ -767,7 +767,7 @@
           <a:p>
             <a:fld id="{63C122E8-8589-4FE8-A359-9E666A3CF659}" type="datetimeFigureOut">
               <a:rPr lang="en-US" smtClean="0"/>
-              <a:t>2/9/2026</a:t>
+              <a:t>2/19/2026</a:t>
             </a:fld>
             <a:endParaRPr lang="en-US"/>
           </a:p>
@@ -1011,7 +1011,7 @@
           <a:p>
             <a:fld id="{63C122E8-8589-4FE8-A359-9E666A3CF659}" type="datetimeFigureOut">
               <a:rPr lang="en-US" smtClean="0"/>
-              <a:t>2/9/2026</a:t>
+              <a:t>2/19/2026</a:t>
             </a:fld>
             <a:endParaRPr lang="en-US"/>
           </a:p>
@@ -1243,7 +1243,7 @@
           <a:p>
             <a:fld id="{63C122E8-8589-4FE8-A359-9E666A3CF659}" type="datetimeFigureOut">
               <a:rPr lang="en-US" smtClean="0"/>
-              <a:t>2/9/2026</a:t>
+              <a:t>2/19/2026</a:t>
             </a:fld>
             <a:endParaRPr lang="en-US"/>
           </a:p>
@@ -1610,7 +1610,7 @@
           <a:p>
             <a:fld id="{63C122E8-8589-4FE8-A359-9E666A3CF659}" type="datetimeFigureOut">
               <a:rPr lang="en-US" smtClean="0"/>
-              <a:t>2/9/2026</a:t>
+              <a:t>2/19/2026</a:t>
             </a:fld>
             <a:endParaRPr lang="en-US"/>
           </a:p>
@@ -1728,7 +1728,7 @@
           <a:p>
             <a:fld id="{63C122E8-8589-4FE8-A359-9E666A3CF659}" type="datetimeFigureOut">
               <a:rPr lang="en-US" smtClean="0"/>
-              <a:t>2/9/2026</a:t>
+              <a:t>2/19/2026</a:t>
             </a:fld>
             <a:endParaRPr lang="en-US"/>
           </a:p>
@@ -1823,7 +1823,7 @@
           <a:p>
             <a:fld id="{63C122E8-8589-4FE8-A359-9E666A3CF659}" type="datetimeFigureOut">
               <a:rPr lang="en-US" smtClean="0"/>
-              <a:t>2/9/2026</a:t>
+              <a:t>2/19/2026</a:t>
             </a:fld>
             <a:endParaRPr lang="en-US"/>
           </a:p>
@@ -2100,7 +2100,7 @@
           <a:p>
             <a:fld id="{63C122E8-8589-4FE8-A359-9E666A3CF659}" type="datetimeFigureOut">
               <a:rPr lang="en-US" smtClean="0"/>
-              <a:t>2/9/2026</a:t>
+              <a:t>2/19/2026</a:t>
             </a:fld>
             <a:endParaRPr lang="en-US"/>
           </a:p>
@@ -2357,7 +2357,7 @@
           <a:p>
             <a:fld id="{63C122E8-8589-4FE8-A359-9E666A3CF659}" type="datetimeFigureOut">
               <a:rPr lang="en-US" smtClean="0"/>
-              <a:t>2/9/2026</a:t>
+              <a:t>2/19/2026</a:t>
             </a:fld>
             <a:endParaRPr lang="en-US"/>
           </a:p>
@@ -2570,7 +2570,7 @@
           <a:p>
             <a:fld id="{63C122E8-8589-4FE8-A359-9E666A3CF659}" type="datetimeFigureOut">
               <a:rPr lang="en-US" smtClean="0"/>
-              <a:t>2/9/2026</a:t>
+              <a:t>2/19/2026</a:t>
             </a:fld>
             <a:endParaRPr lang="en-US"/>
           </a:p>
@@ -3728,6 +3728,466 @@
           <a:chExt cx="0" cy="0"/>
         </a:xfrm>
       </p:grpSpPr>
+      <p:sp>
+        <p:nvSpPr>
+          <p:cNvPr id="7" name="矩形 6">
+            <a:extLst>
+              <a:ext uri="{FF2B5EF4-FFF2-40B4-BE49-F238E27FC236}">
+                <a16:creationId xmlns:a16="http://schemas.microsoft.com/office/drawing/2014/main" id="{04F5FB97-320C-9704-86C3-F803B6AF1CFE}"/>
+              </a:ext>
+            </a:extLst>
+          </p:cNvPr>
+          <p:cNvSpPr/>
+          <p:nvPr/>
+        </p:nvSpPr>
+        <p:spPr>
+          <a:xfrm>
+            <a:off x="0" y="0"/>
+            <a:ext cx="6858000" cy="6858000"/>
+          </a:xfrm>
+          <a:prstGeom prst="rect">
+            <a:avLst/>
+          </a:prstGeom>
+          <a:solidFill>
+            <a:srgbClr val="A92333"/>
+          </a:solidFill>
+          <a:ln>
+            <a:noFill/>
+          </a:ln>
+        </p:spPr>
+        <p:style>
+          <a:lnRef idx="2">
+            <a:schemeClr val="accent1">
+              <a:shade val="15000"/>
+            </a:schemeClr>
+          </a:lnRef>
+          <a:fillRef idx="1">
+            <a:schemeClr val="accent1"/>
+          </a:fillRef>
+          <a:effectRef idx="0">
+            <a:schemeClr val="accent1"/>
+          </a:effectRef>
+          <a:fontRef idx="minor">
+            <a:schemeClr val="lt1"/>
+          </a:fontRef>
+        </p:style>
+        <p:txBody>
+          <a:bodyPr rtlCol="0" anchor="ctr"/>
+          <a:lstStyle/>
+          <a:p>
+            <a:pPr algn="ctr"/>
+            <a:endParaRPr lang="en-US"/>
+          </a:p>
+        </p:txBody>
+      </p:sp>
+      <p:grpSp>
+        <p:nvGrpSpPr>
+          <p:cNvPr id="6" name="组合 5">
+            <a:extLst>
+              <a:ext uri="{FF2B5EF4-FFF2-40B4-BE49-F238E27FC236}">
+                <a16:creationId xmlns:a16="http://schemas.microsoft.com/office/drawing/2014/main" id="{C8599E28-18A5-A72F-FA64-DAE232DF3596}"/>
+              </a:ext>
+            </a:extLst>
+          </p:cNvPr>
+          <p:cNvGrpSpPr/>
+          <p:nvPr/>
+        </p:nvGrpSpPr>
+        <p:grpSpPr>
+          <a:xfrm>
+            <a:off x="919424" y="708409"/>
+            <a:ext cx="4917936" cy="5451094"/>
+            <a:chOff x="1333784" y="990365"/>
+            <a:chExt cx="4089216" cy="4887182"/>
+          </a:xfrm>
+        </p:grpSpPr>
+        <p:sp>
+          <p:nvSpPr>
+            <p:cNvPr id="2" name="矩形: 圆角 1">
+              <a:extLst>
+                <a:ext uri="{FF2B5EF4-FFF2-40B4-BE49-F238E27FC236}">
+                  <a16:creationId xmlns:a16="http://schemas.microsoft.com/office/drawing/2014/main" id="{6BEB0429-24DB-11FE-FA3D-5444D8A9138B}"/>
+                </a:ext>
+              </a:extLst>
+            </p:cNvPr>
+            <p:cNvSpPr/>
+            <p:nvPr/>
+          </p:nvSpPr>
+          <p:spPr>
+            <a:xfrm rot="20826913">
+              <a:off x="1333784" y="2257921"/>
+              <a:ext cx="3035898" cy="3619626"/>
+            </a:xfrm>
+            <a:prstGeom prst="roundRect">
+              <a:avLst>
+                <a:gd name="adj" fmla="val 25517"/>
+              </a:avLst>
+            </a:prstGeom>
+            <a:solidFill>
+              <a:srgbClr val="FFFFFF">
+                <a:alpha val="20000"/>
+              </a:srgbClr>
+            </a:solidFill>
+            <a:ln>
+              <a:noFill/>
+            </a:ln>
+          </p:spPr>
+          <p:style>
+            <a:lnRef idx="2">
+              <a:schemeClr val="accent1">
+                <a:shade val="15000"/>
+              </a:schemeClr>
+            </a:lnRef>
+            <a:fillRef idx="1">
+              <a:schemeClr val="accent1"/>
+            </a:fillRef>
+            <a:effectRef idx="0">
+              <a:schemeClr val="accent1"/>
+            </a:effectRef>
+            <a:fontRef idx="minor">
+              <a:schemeClr val="lt1"/>
+            </a:fontRef>
+          </p:style>
+          <p:txBody>
+            <a:bodyPr rtlCol="0" anchor="ctr"/>
+            <a:lstStyle/>
+            <a:p>
+              <a:pPr algn="ctr"/>
+              <a:endParaRPr lang="en-US"/>
+            </a:p>
+          </p:txBody>
+        </p:sp>
+        <p:sp>
+          <p:nvSpPr>
+            <p:cNvPr id="3" name="矩形: 圆角 2">
+              <a:extLst>
+                <a:ext uri="{FF2B5EF4-FFF2-40B4-BE49-F238E27FC236}">
+                  <a16:creationId xmlns:a16="http://schemas.microsoft.com/office/drawing/2014/main" id="{7F045C32-96DE-4B0C-8921-0A9C9A197A42}"/>
+                </a:ext>
+              </a:extLst>
+            </p:cNvPr>
+            <p:cNvSpPr/>
+            <p:nvPr/>
+          </p:nvSpPr>
+          <p:spPr>
+            <a:xfrm rot="20826913">
+              <a:off x="1601176" y="1771657"/>
+              <a:ext cx="3149527" cy="3714180"/>
+            </a:xfrm>
+            <a:prstGeom prst="roundRect">
+              <a:avLst>
+                <a:gd name="adj" fmla="val 20952"/>
+              </a:avLst>
+            </a:prstGeom>
+            <a:solidFill>
+              <a:srgbClr val="FFFFFF">
+                <a:alpha val="40000"/>
+              </a:srgbClr>
+            </a:solidFill>
+            <a:ln>
+              <a:noFill/>
+            </a:ln>
+          </p:spPr>
+          <p:style>
+            <a:lnRef idx="2">
+              <a:schemeClr val="accent1">
+                <a:shade val="15000"/>
+              </a:schemeClr>
+            </a:lnRef>
+            <a:fillRef idx="1">
+              <a:schemeClr val="accent1"/>
+            </a:fillRef>
+            <a:effectRef idx="0">
+              <a:schemeClr val="accent1"/>
+            </a:effectRef>
+            <a:fontRef idx="minor">
+              <a:schemeClr val="lt1"/>
+            </a:fontRef>
+          </p:style>
+          <p:txBody>
+            <a:bodyPr rtlCol="0" anchor="ctr"/>
+            <a:lstStyle/>
+            <a:p>
+              <a:pPr algn="ctr"/>
+              <a:endParaRPr lang="en-US"/>
+            </a:p>
+          </p:txBody>
+        </p:sp>
+        <p:sp>
+          <p:nvSpPr>
+            <p:cNvPr id="4" name="矩形: 圆角 3">
+              <a:extLst>
+                <a:ext uri="{FF2B5EF4-FFF2-40B4-BE49-F238E27FC236}">
+                  <a16:creationId xmlns:a16="http://schemas.microsoft.com/office/drawing/2014/main" id="{A9EA66AA-A617-C207-B30A-06488658E1EA}"/>
+                </a:ext>
+              </a:extLst>
+            </p:cNvPr>
+            <p:cNvSpPr/>
+            <p:nvPr/>
+          </p:nvSpPr>
+          <p:spPr>
+            <a:xfrm rot="20826913">
+              <a:off x="1904046" y="1381011"/>
+              <a:ext cx="3149527" cy="3714180"/>
+            </a:xfrm>
+            <a:prstGeom prst="roundRect">
+              <a:avLst>
+                <a:gd name="adj" fmla="val 13812"/>
+              </a:avLst>
+            </a:prstGeom>
+            <a:solidFill>
+              <a:srgbClr val="FFFFFF">
+                <a:alpha val="60000"/>
+              </a:srgbClr>
+            </a:solidFill>
+            <a:ln>
+              <a:noFill/>
+            </a:ln>
+          </p:spPr>
+          <p:style>
+            <a:lnRef idx="2">
+              <a:schemeClr val="accent1">
+                <a:shade val="15000"/>
+              </a:schemeClr>
+            </a:lnRef>
+            <a:fillRef idx="1">
+              <a:schemeClr val="accent1"/>
+            </a:fillRef>
+            <a:effectRef idx="0">
+              <a:schemeClr val="accent1"/>
+            </a:effectRef>
+            <a:fontRef idx="minor">
+              <a:schemeClr val="lt1"/>
+            </a:fontRef>
+          </p:style>
+          <p:txBody>
+            <a:bodyPr rtlCol="0" anchor="ctr"/>
+            <a:lstStyle/>
+            <a:p>
+              <a:pPr algn="ctr"/>
+              <a:endParaRPr lang="en-US"/>
+            </a:p>
+          </p:txBody>
+        </p:sp>
+        <p:sp>
+          <p:nvSpPr>
+            <p:cNvPr id="5" name="任意多边形: 形状 4">
+              <a:extLst>
+                <a:ext uri="{FF2B5EF4-FFF2-40B4-BE49-F238E27FC236}">
+                  <a16:creationId xmlns:a16="http://schemas.microsoft.com/office/drawing/2014/main" id="{CBB5FFB1-AF4F-497B-8A19-9D9776997415}"/>
+                </a:ext>
+              </a:extLst>
+            </p:cNvPr>
+            <p:cNvSpPr/>
+            <p:nvPr/>
+          </p:nvSpPr>
+          <p:spPr>
+            <a:xfrm rot="20826913">
+              <a:off x="2273473" y="990365"/>
+              <a:ext cx="3149527" cy="3714180"/>
+            </a:xfrm>
+            <a:custGeom>
+              <a:avLst/>
+              <a:gdLst>
+                <a:gd name="csX0" fmla="*/ 2959987 w 3149527"/>
+                <a:gd name="csY0" fmla="*/ 4823 h 3714180"/>
+                <a:gd name="csX1" fmla="*/ 3149527 w 3149527"/>
+                <a:gd name="csY1" fmla="*/ 237380 h 3714180"/>
+                <a:gd name="csX2" fmla="*/ 3149527 w 3149527"/>
+                <a:gd name="csY2" fmla="*/ 3476800 h 3714180"/>
+                <a:gd name="csX3" fmla="*/ 2912147 w 3149527"/>
+                <a:gd name="csY3" fmla="*/ 3714180 h 3714180"/>
+                <a:gd name="csX4" fmla="*/ 237380 w 3149527"/>
+                <a:gd name="csY4" fmla="*/ 3714180 h 3714180"/>
+                <a:gd name="csX5" fmla="*/ 0 w 3149527"/>
+                <a:gd name="csY5" fmla="*/ 3476800 h 3714180"/>
+                <a:gd name="csX6" fmla="*/ 0 w 3149527"/>
+                <a:gd name="csY6" fmla="*/ 237380 h 3714180"/>
+                <a:gd name="csX7" fmla="*/ 237380 w 3149527"/>
+                <a:gd name="csY7" fmla="*/ 0 h 3714180"/>
+                <a:gd name="csX8" fmla="*/ 1959227 w 3149527"/>
+                <a:gd name="csY8" fmla="*/ 0 h 3714180"/>
+                <a:gd name="csX9" fmla="*/ 1959965 w 3149527"/>
+                <a:gd name="csY9" fmla="*/ 2089 h 3714180"/>
+                <a:gd name="csX10" fmla="*/ 1795723 w 3149527"/>
+                <a:gd name="csY10" fmla="*/ 1977860 h 3714180"/>
+                <a:gd name="csX11" fmla="*/ 2087688 w 3149527"/>
+                <a:gd name="csY11" fmla="*/ 1701665 h 3714180"/>
+                <a:gd name="csX12" fmla="*/ 2541911 w 3149527"/>
+                <a:gd name="csY12" fmla="*/ 1979998 h 3714180"/>
+                <a:gd name="csX13" fmla="*/ 2706153 w 3149527"/>
+                <a:gd name="csY13" fmla="*/ 4227 h 3714180"/>
+                <a:gd name="csX14" fmla="*/ 2704662 w 3149527"/>
+                <a:gd name="csY14" fmla="*/ 0 h 3714180"/>
+                <a:gd name="csX15" fmla="*/ 2912147 w 3149527"/>
+                <a:gd name="csY15" fmla="*/ 0 h 3714180"/>
+                <a:gd name="csX16" fmla="*/ 2959987 w 3149527"/>
+                <a:gd name="csY16" fmla="*/ 4823 h 3714180"/>
+              </a:gdLst>
+              <a:ahLst/>
+              <a:cxnLst>
+                <a:cxn ang="0">
+                  <a:pos x="csX0" y="csY0"/>
+                </a:cxn>
+                <a:cxn ang="0">
+                  <a:pos x="csX1" y="csY1"/>
+                </a:cxn>
+                <a:cxn ang="0">
+                  <a:pos x="csX2" y="csY2"/>
+                </a:cxn>
+                <a:cxn ang="0">
+                  <a:pos x="csX3" y="csY3"/>
+                </a:cxn>
+                <a:cxn ang="0">
+                  <a:pos x="csX4" y="csY4"/>
+                </a:cxn>
+                <a:cxn ang="0">
+                  <a:pos x="csX5" y="csY5"/>
+                </a:cxn>
+                <a:cxn ang="0">
+                  <a:pos x="csX6" y="csY6"/>
+                </a:cxn>
+                <a:cxn ang="0">
+                  <a:pos x="csX7" y="csY7"/>
+                </a:cxn>
+                <a:cxn ang="0">
+                  <a:pos x="csX8" y="csY8"/>
+                </a:cxn>
+                <a:cxn ang="0">
+                  <a:pos x="csX9" y="csY9"/>
+                </a:cxn>
+                <a:cxn ang="0">
+                  <a:pos x="csX10" y="csY10"/>
+                </a:cxn>
+                <a:cxn ang="0">
+                  <a:pos x="csX11" y="csY11"/>
+                </a:cxn>
+                <a:cxn ang="0">
+                  <a:pos x="csX12" y="csY12"/>
+                </a:cxn>
+                <a:cxn ang="0">
+                  <a:pos x="csX13" y="csY13"/>
+                </a:cxn>
+                <a:cxn ang="0">
+                  <a:pos x="csX14" y="csY14"/>
+                </a:cxn>
+                <a:cxn ang="0">
+                  <a:pos x="csX15" y="csY15"/>
+                </a:cxn>
+                <a:cxn ang="0">
+                  <a:pos x="csX16" y="csY16"/>
+                </a:cxn>
+              </a:cxnLst>
+              <a:rect l="l" t="t" r="r" b="b"/>
+              <a:pathLst>
+                <a:path w="3149527" h="3714180">
+                  <a:moveTo>
+                    <a:pt x="2959987" y="4823"/>
+                  </a:moveTo>
+                  <a:cubicBezTo>
+                    <a:pt x="3068157" y="26958"/>
+                    <a:pt x="3149527" y="122667"/>
+                    <a:pt x="3149527" y="237380"/>
+                  </a:cubicBezTo>
+                  <a:lnTo>
+                    <a:pt x="3149527" y="3476800"/>
+                  </a:lnTo>
+                  <a:cubicBezTo>
+                    <a:pt x="3149527" y="3607901"/>
+                    <a:pt x="3043248" y="3714180"/>
+                    <a:pt x="2912147" y="3714180"/>
+                  </a:cubicBezTo>
+                  <a:lnTo>
+                    <a:pt x="237380" y="3714180"/>
+                  </a:lnTo>
+                  <a:cubicBezTo>
+                    <a:pt x="106279" y="3714180"/>
+                    <a:pt x="0" y="3607901"/>
+                    <a:pt x="0" y="3476800"/>
+                  </a:cubicBezTo>
+                  <a:lnTo>
+                    <a:pt x="0" y="237380"/>
+                  </a:lnTo>
+                  <a:cubicBezTo>
+                    <a:pt x="0" y="106279"/>
+                    <a:pt x="106279" y="0"/>
+                    <a:pt x="237380" y="0"/>
+                  </a:cubicBezTo>
+                  <a:lnTo>
+                    <a:pt x="1959227" y="0"/>
+                  </a:lnTo>
+                  <a:lnTo>
+                    <a:pt x="1959965" y="2089"/>
+                  </a:lnTo>
+                  <a:cubicBezTo>
+                    <a:pt x="2151896" y="661386"/>
+                    <a:pt x="1233773" y="1317502"/>
+                    <a:pt x="1795723" y="1977860"/>
+                  </a:cubicBezTo>
+                  <a:cubicBezTo>
+                    <a:pt x="1920685" y="1978971"/>
+                    <a:pt x="1962726" y="1700554"/>
+                    <a:pt x="2087688" y="1701665"/>
+                  </a:cubicBezTo>
+                  <a:cubicBezTo>
+                    <a:pt x="2212649" y="1702775"/>
+                    <a:pt x="2418144" y="1980396"/>
+                    <a:pt x="2541911" y="1979998"/>
+                  </a:cubicBezTo>
+                  <a:cubicBezTo>
+                    <a:pt x="1979962" y="1319641"/>
+                    <a:pt x="2898085" y="663524"/>
+                    <a:pt x="2706153" y="4227"/>
+                  </a:cubicBezTo>
+                  <a:lnTo>
+                    <a:pt x="2704662" y="0"/>
+                  </a:lnTo>
+                  <a:lnTo>
+                    <a:pt x="2912147" y="0"/>
+                  </a:lnTo>
+                  <a:cubicBezTo>
+                    <a:pt x="2928535" y="0"/>
+                    <a:pt x="2944534" y="1661"/>
+                    <a:pt x="2959987" y="4823"/>
+                  </a:cubicBezTo>
+                  <a:close/>
+                </a:path>
+              </a:pathLst>
+            </a:custGeom>
+            <a:solidFill>
+              <a:srgbClr val="FFFFFF"/>
+            </a:solidFill>
+            <a:ln>
+              <a:noFill/>
+            </a:ln>
+          </p:spPr>
+          <p:style>
+            <a:lnRef idx="2">
+              <a:schemeClr val="accent1">
+                <a:shade val="15000"/>
+              </a:schemeClr>
+            </a:lnRef>
+            <a:fillRef idx="1">
+              <a:schemeClr val="accent1"/>
+            </a:fillRef>
+            <a:effectRef idx="0">
+              <a:schemeClr val="accent1"/>
+            </a:effectRef>
+            <a:fontRef idx="minor">
+              <a:schemeClr val="lt1"/>
+            </a:fontRef>
+          </p:style>
+          <p:txBody>
+            <a:bodyPr wrap="square" rtlCol="0" anchor="ctr">
+              <a:noAutofit/>
+            </a:bodyPr>
+            <a:lstStyle/>
+            <a:p>
+              <a:pPr algn="ctr"/>
+              <a:endParaRPr lang="en-US"/>
+            </a:p>
+          </p:txBody>
+        </p:sp>
+      </p:grpSp>
     </p:spTree>
     <p:extLst>
       <p:ext uri="{BB962C8B-B14F-4D97-AF65-F5344CB8AC3E}">

</xml_diff>